<commit_message>
1st complete draft ppt
</commit_message>
<xml_diff>
--- a/Presentation.pptx
+++ b/Presentation.pptx
@@ -9,8 +9,9 @@
     <p:sldId id="257" r:id="rId3"/>
     <p:sldId id="258" r:id="rId4"/>
     <p:sldId id="259" r:id="rId5"/>
-    <p:sldId id="260" r:id="rId6"/>
+    <p:sldId id="262" r:id="rId6"/>
     <p:sldId id="261" r:id="rId7"/>
+    <p:sldId id="260" r:id="rId8"/>
   </p:sldIdLst>
   <p:sldSz cx="12192000" cy="6858000"/>
   <p:notesSz cx="6858000" cy="9144000"/>
@@ -120,7 +121,7 @@
 <file path=ppt/revisionInfo.xml><?xml version="1.0" encoding="utf-8"?>
 <p1510:revInfo xmlns:a="http://schemas.openxmlformats.org/drawingml/2006/main" xmlns:r="http://schemas.openxmlformats.org/officeDocument/2006/relationships" xmlns:p1510="http://schemas.microsoft.com/office/powerpoint/2015/10/main">
   <p1510:revLst>
-    <p1510:client id="{699AED76-FAFB-4B39-8FB1-D0317DBCF86B}" v="1" dt="2024-12-05T14:04:03.894"/>
+    <p1510:client id="{699AED76-FAFB-4B39-8FB1-D0317DBCF86B}" v="7" dt="2024-12-05T14:22:41.120"/>
   </p1510:revLst>
 </p1510:revInfo>
 </file>
@@ -129,8 +130,8 @@
 <pc:chgInfo xmlns:a="http://schemas.openxmlformats.org/drawingml/2006/main" xmlns:r="http://schemas.openxmlformats.org/officeDocument/2006/relationships" xmlns:ac="http://schemas.microsoft.com/office/drawing/2013/main/command" xmlns:pc="http://schemas.microsoft.com/office/powerpoint/2013/main/command">
   <pc:docChgLst>
     <pc:chgData name="Amulya Jasti" userId="82e29e3d824155ae" providerId="LiveId" clId="{699AED76-FAFB-4B39-8FB1-D0317DBCF86B}"/>
-    <pc:docChg chg="custSel addSld modSld">
-      <pc:chgData name="Amulya Jasti" userId="82e29e3d824155ae" providerId="LiveId" clId="{699AED76-FAFB-4B39-8FB1-D0317DBCF86B}" dt="2024-12-05T14:04:39.158" v="663" actId="20577"/>
+    <pc:docChg chg="undo custSel addSld delSld modSld sldOrd">
+      <pc:chgData name="Amulya Jasti" userId="82e29e3d824155ae" providerId="LiveId" clId="{699AED76-FAFB-4B39-8FB1-D0317DBCF86B}" dt="2024-12-05T14:23:45.210" v="1553" actId="20577"/>
       <pc:docMkLst>
         <pc:docMk/>
       </pc:docMkLst>
@@ -234,8 +235,8 @@
           </ac:picMkLst>
         </pc:picChg>
       </pc:sldChg>
-      <pc:sldChg chg="modSp new mod">
-        <pc:chgData name="Amulya Jasti" userId="82e29e3d824155ae" providerId="LiveId" clId="{699AED76-FAFB-4B39-8FB1-D0317DBCF86B}" dt="2024-12-05T14:04:39.158" v="663" actId="20577"/>
+      <pc:sldChg chg="modSp new mod ord">
+        <pc:chgData name="Amulya Jasti" userId="82e29e3d824155ae" providerId="LiveId" clId="{699AED76-FAFB-4B39-8FB1-D0317DBCF86B}" dt="2024-12-05T14:23:45.210" v="1553" actId="20577"/>
         <pc:sldMkLst>
           <pc:docMk/>
           <pc:sldMk cId="3991349698" sldId="260"/>
@@ -249,7 +250,7 @@
           </ac:spMkLst>
         </pc:spChg>
         <pc:spChg chg="mod">
-          <ac:chgData name="Amulya Jasti" userId="82e29e3d824155ae" providerId="LiveId" clId="{699AED76-FAFB-4B39-8FB1-D0317DBCF86B}" dt="2024-12-05T14:04:39.158" v="663" actId="20577"/>
+          <ac:chgData name="Amulya Jasti" userId="82e29e3d824155ae" providerId="LiveId" clId="{699AED76-FAFB-4B39-8FB1-D0317DBCF86B}" dt="2024-12-05T14:23:45.210" v="1553" actId="20577"/>
           <ac:spMkLst>
             <pc:docMk/>
             <pc:sldMk cId="3991349698" sldId="260"/>
@@ -258,7 +259,7 @@
         </pc:spChg>
       </pc:sldChg>
       <pc:sldChg chg="modSp new mod">
-        <pc:chgData name="Amulya Jasti" userId="82e29e3d824155ae" providerId="LiveId" clId="{699AED76-FAFB-4B39-8FB1-D0317DBCF86B}" dt="2024-12-05T05:33:25.280" v="579" actId="15"/>
+        <pc:chgData name="Amulya Jasti" userId="82e29e3d824155ae" providerId="LiveId" clId="{699AED76-FAFB-4B39-8FB1-D0317DBCF86B}" dt="2024-12-05T14:18:28.719" v="1355" actId="20577"/>
         <pc:sldMkLst>
           <pc:docMk/>
           <pc:sldMk cId="3920395960" sldId="261"/>
@@ -272,13 +273,96 @@
           </ac:spMkLst>
         </pc:spChg>
         <pc:spChg chg="mod">
-          <ac:chgData name="Amulya Jasti" userId="82e29e3d824155ae" providerId="LiveId" clId="{699AED76-FAFB-4B39-8FB1-D0317DBCF86B}" dt="2024-12-05T05:33:25.280" v="579" actId="15"/>
+          <ac:chgData name="Amulya Jasti" userId="82e29e3d824155ae" providerId="LiveId" clId="{699AED76-FAFB-4B39-8FB1-D0317DBCF86B}" dt="2024-12-05T14:18:28.719" v="1355" actId="20577"/>
           <ac:spMkLst>
             <pc:docMk/>
             <pc:sldMk cId="3920395960" sldId="261"/>
             <ac:spMk id="3" creationId="{FA2222B3-93A5-77BE-E4BE-1FE250A6B072}"/>
           </ac:spMkLst>
         </pc:spChg>
+      </pc:sldChg>
+      <pc:sldChg chg="addSp delSp modSp add mod">
+        <pc:chgData name="Amulya Jasti" userId="82e29e3d824155ae" providerId="LiveId" clId="{699AED76-FAFB-4B39-8FB1-D0317DBCF86B}" dt="2024-12-05T14:22:47.392" v="1408" actId="1076"/>
+        <pc:sldMkLst>
+          <pc:docMk/>
+          <pc:sldMk cId="1185308532" sldId="262"/>
+        </pc:sldMkLst>
+        <pc:spChg chg="mod">
+          <ac:chgData name="Amulya Jasti" userId="82e29e3d824155ae" providerId="LiveId" clId="{699AED76-FAFB-4B39-8FB1-D0317DBCF86B}" dt="2024-12-05T14:19:12.393" v="1396" actId="20577"/>
+          <ac:spMkLst>
+            <pc:docMk/>
+            <pc:sldMk cId="1185308532" sldId="262"/>
+            <ac:spMk id="2" creationId="{06CC4BCB-47A6-5FD5-6F6D-6B280EAB576C}"/>
+          </ac:spMkLst>
+        </pc:spChg>
+        <pc:spChg chg="del">
+          <ac:chgData name="Amulya Jasti" userId="82e29e3d824155ae" providerId="LiveId" clId="{699AED76-FAFB-4B39-8FB1-D0317DBCF86B}" dt="2024-12-05T14:19:19.480" v="1398" actId="478"/>
+          <ac:spMkLst>
+            <pc:docMk/>
+            <pc:sldMk cId="1185308532" sldId="262"/>
+            <ac:spMk id="3" creationId="{6881FA01-0483-34C4-2740-6A08CF1B9FBA}"/>
+          </ac:spMkLst>
+        </pc:spChg>
+        <pc:spChg chg="add del mod">
+          <ac:chgData name="Amulya Jasti" userId="82e29e3d824155ae" providerId="LiveId" clId="{699AED76-FAFB-4B39-8FB1-D0317DBCF86B}" dt="2024-12-05T14:19:21.810" v="1399" actId="478"/>
+          <ac:spMkLst>
+            <pc:docMk/>
+            <pc:sldMk cId="1185308532" sldId="262"/>
+            <ac:spMk id="6" creationId="{930D0618-DF07-23EE-2066-5813A7162391}"/>
+          </ac:spMkLst>
+        </pc:spChg>
+        <pc:picChg chg="del">
+          <ac:chgData name="Amulya Jasti" userId="82e29e3d824155ae" providerId="LiveId" clId="{699AED76-FAFB-4B39-8FB1-D0317DBCF86B}" dt="2024-12-05T14:19:16.101" v="1397" actId="478"/>
+          <ac:picMkLst>
+            <pc:docMk/>
+            <pc:sldMk cId="1185308532" sldId="262"/>
+            <ac:picMk id="5" creationId="{A298C1D6-F566-557B-231A-5A04364F2BCE}"/>
+          </ac:picMkLst>
+        </pc:picChg>
+        <pc:picChg chg="add mod">
+          <ac:chgData name="Amulya Jasti" userId="82e29e3d824155ae" providerId="LiveId" clId="{699AED76-FAFB-4B39-8FB1-D0317DBCF86B}" dt="2024-12-05T14:22:47.392" v="1408" actId="1076"/>
+          <ac:picMkLst>
+            <pc:docMk/>
+            <pc:sldMk cId="1185308532" sldId="262"/>
+            <ac:picMk id="8" creationId="{D8F2C9C7-31F9-B7DF-C43D-24430955B8B0}"/>
+          </ac:picMkLst>
+        </pc:picChg>
+      </pc:sldChg>
+      <pc:sldChg chg="new del">
+        <pc:chgData name="Amulya Jasti" userId="82e29e3d824155ae" providerId="LiveId" clId="{699AED76-FAFB-4B39-8FB1-D0317DBCF86B}" dt="2024-12-05T14:19:04.413" v="1364" actId="680"/>
+        <pc:sldMkLst>
+          <pc:docMk/>
+          <pc:sldMk cId="2936308585" sldId="262"/>
+        </pc:sldMkLst>
+      </pc:sldChg>
+      <pc:sldChg chg="modSp new del mod">
+        <pc:chgData name="Amulya Jasti" userId="82e29e3d824155ae" providerId="LiveId" clId="{699AED76-FAFB-4B39-8FB1-D0317DBCF86B}" dt="2024-12-05T14:18:59.292" v="1362" actId="47"/>
+        <pc:sldMkLst>
+          <pc:docMk/>
+          <pc:sldMk cId="3625397823" sldId="262"/>
+        </pc:sldMkLst>
+        <pc:spChg chg="mod">
+          <ac:chgData name="Amulya Jasti" userId="82e29e3d824155ae" providerId="LiveId" clId="{699AED76-FAFB-4B39-8FB1-D0317DBCF86B}" dt="2024-12-05T14:18:57.172" v="1361" actId="20577"/>
+          <ac:spMkLst>
+            <pc:docMk/>
+            <pc:sldMk cId="3625397823" sldId="262"/>
+            <ac:spMk id="2" creationId="{0D71597D-D3A0-D9CA-E614-CC1676138063}"/>
+          </ac:spMkLst>
+        </pc:spChg>
+      </pc:sldChg>
+      <pc:sldChg chg="add del">
+        <pc:chgData name="Amulya Jasti" userId="82e29e3d824155ae" providerId="LiveId" clId="{699AED76-FAFB-4B39-8FB1-D0317DBCF86B}" dt="2024-12-05T14:21:18.038" v="1401"/>
+        <pc:sldMkLst>
+          <pc:docMk/>
+          <pc:sldMk cId="2040100152" sldId="263"/>
+        </pc:sldMkLst>
+      </pc:sldChg>
+      <pc:sldChg chg="add del">
+        <pc:chgData name="Amulya Jasti" userId="82e29e3d824155ae" providerId="LiveId" clId="{699AED76-FAFB-4B39-8FB1-D0317DBCF86B}" dt="2024-12-05T14:21:23.076" v="1403"/>
+        <pc:sldMkLst>
+          <pc:docMk/>
+          <pc:sldMk cId="3185777392" sldId="263"/>
+        </pc:sldMkLst>
       </pc:sldChg>
     </pc:docChg>
   </pc:docChgLst>
@@ -4014,7 +4098,13 @@
   <p:cSld>
     <p:spTree>
       <p:nvGrpSpPr>
-        <p:cNvPr id="1" name=""/>
+        <p:cNvPr id="1" name="">
+          <a:extLst>
+            <a:ext uri="{FF2B5EF4-FFF2-40B4-BE49-F238E27FC236}">
+              <a16:creationId xmlns:a16="http://schemas.microsoft.com/office/drawing/2014/main" id="{17440ABB-E972-8E6F-3BED-FCCEBF204DDD}"/>
+            </a:ext>
+          </a:extLst>
+        </p:cNvPr>
         <p:cNvGrpSpPr/>
         <p:nvPr/>
       </p:nvGrpSpPr>
@@ -4031,7 +4121,7 @@
           <p:cNvPr id="2" name="Title 1">
             <a:extLst>
               <a:ext uri="{FF2B5EF4-FFF2-40B4-BE49-F238E27FC236}">
-                <a16:creationId xmlns:a16="http://schemas.microsoft.com/office/drawing/2014/main" id="{CC12B01E-DA83-918F-9770-400EA1DB6321}"/>
+                <a16:creationId xmlns:a16="http://schemas.microsoft.com/office/drawing/2014/main" id="{06CC4BCB-47A6-5FD5-6F6D-6B280EAB576C}"/>
               </a:ext>
             </a:extLst>
           </p:cNvPr>
@@ -4051,54 +4141,51 @@
               <a:rPr lang="en-US" dirty="0">
                 <a:latin typeface="Century Schoolbook" panose="02040604050505020304" pitchFamily="18" charset="0"/>
               </a:rPr>
-              <a:t>Potential Improvements</a:t>
-            </a:r>
-          </a:p>
-        </p:txBody>
-      </p:sp>
-      <p:sp>
-        <p:nvSpPr>
-          <p:cNvPr id="3" name="Content Placeholder 2">
-            <a:extLst>
-              <a:ext uri="{FF2B5EF4-FFF2-40B4-BE49-F238E27FC236}">
-                <a16:creationId xmlns:a16="http://schemas.microsoft.com/office/drawing/2014/main" id="{D4E77A62-7133-76B5-F536-C67A5AA8F2E0}"/>
-              </a:ext>
-            </a:extLst>
-          </p:cNvPr>
-          <p:cNvSpPr>
-            <a:spLocks noGrp="1"/>
-          </p:cNvSpPr>
-          <p:nvPr>
-            <p:ph idx="1"/>
-          </p:nvPr>
-        </p:nvSpPr>
-        <p:spPr/>
-        <p:txBody>
-          <a:bodyPr/>
-          <a:lstStyle/>
-          <a:p>
-            <a:r>
-              <a:rPr lang="en-US" dirty="0">
-                <a:latin typeface="Century Schoolbook" panose="02040604050505020304" pitchFamily="18" charset="0"/>
-              </a:rPr>
-              <a:t>Study percentiles </a:t>
-            </a:r>
-            <a:r>
-              <a:rPr lang="en-US">
-                <a:latin typeface="Century Schoolbook" panose="02040604050505020304" pitchFamily="18" charset="0"/>
-              </a:rPr>
-              <a:t>of consumption</a:t>
-            </a:r>
-            <a:endParaRPr lang="en-US" dirty="0">
-              <a:latin typeface="Century Schoolbook" panose="02040604050505020304" pitchFamily="18" charset="0"/>
-            </a:endParaRPr>
-          </a:p>
-        </p:txBody>
-      </p:sp>
+              <a:t>Same trends observed regionally</a:t>
+            </a:r>
+          </a:p>
+        </p:txBody>
+      </p:sp>
+      <p:pic>
+        <p:nvPicPr>
+          <p:cNvPr id="8" name="Picture 7" descr="A map with blue and red text&#10;&#10;Description automatically generated">
+            <a:extLst>
+              <a:ext uri="{FF2B5EF4-FFF2-40B4-BE49-F238E27FC236}">
+                <a16:creationId xmlns:a16="http://schemas.microsoft.com/office/drawing/2014/main" id="{D8F2C9C7-31F9-B7DF-C43D-24430955B8B0}"/>
+              </a:ext>
+            </a:extLst>
+          </p:cNvPr>
+          <p:cNvPicPr>
+            <a:picLocks noChangeAspect="1"/>
+          </p:cNvPicPr>
+          <p:nvPr/>
+        </p:nvPicPr>
+        <p:blipFill>
+          <a:blip r:embed="rId2">
+            <a:extLst>
+              <a:ext uri="{28A0092B-C50C-407E-A947-70E740481C1C}">
+                <a14:useLocalDpi xmlns:a14="http://schemas.microsoft.com/office/drawing/2010/main" val="0"/>
+              </a:ext>
+            </a:extLst>
+          </a:blip>
+          <a:stretch>
+            <a:fillRect/>
+          </a:stretch>
+        </p:blipFill>
+        <p:spPr>
+          <a:xfrm>
+            <a:off x="838200" y="1846294"/>
+            <a:ext cx="10515600" cy="4646581"/>
+          </a:xfrm>
+          <a:prstGeom prst="rect">
+            <a:avLst/>
+          </a:prstGeom>
+        </p:spPr>
+      </p:pic>
     </p:spTree>
     <p:extLst>
       <p:ext uri="{BB962C8B-B14F-4D97-AF65-F5344CB8AC3E}">
-        <p14:creationId xmlns:p14="http://schemas.microsoft.com/office/powerpoint/2010/main" val="3991349698"/>
+        <p14:creationId xmlns:p14="http://schemas.microsoft.com/office/powerpoint/2010/main" val="1185308532"/>
       </p:ext>
     </p:extLst>
   </p:cSld>
@@ -4185,6 +4272,72 @@
           </a:p>
           <a:p>
             <a:pPr lvl="1"/>
+            <a:r>
+              <a:rPr lang="en-US" dirty="0">
+                <a:latin typeface="Century Schoolbook" panose="02040604050505020304" pitchFamily="18" charset="0"/>
+              </a:rPr>
+              <a:t>5:00pm-9:00pm</a:t>
+            </a:r>
+          </a:p>
+          <a:p>
+            <a:pPr lvl="1"/>
+            <a:r>
+              <a:rPr lang="en-US" dirty="0">
+                <a:latin typeface="Century Schoolbook" panose="02040604050505020304" pitchFamily="18" charset="0"/>
+              </a:rPr>
+              <a:t>Greater than 275 </a:t>
+            </a:r>
+            <a:r>
+              <a:rPr lang="en-US" dirty="0" err="1">
+                <a:latin typeface="Century Schoolbook" panose="02040604050505020304" pitchFamily="18" charset="0"/>
+              </a:rPr>
+              <a:t>kwH</a:t>
+            </a:r>
+            <a:endParaRPr lang="en-US" dirty="0">
+              <a:latin typeface="Century Schoolbook" panose="02040604050505020304" pitchFamily="18" charset="0"/>
+            </a:endParaRPr>
+          </a:p>
+          <a:p>
+            <a:r>
+              <a:rPr lang="en-US" dirty="0">
+                <a:latin typeface="Century Schoolbook" panose="02040604050505020304" pitchFamily="18" charset="0"/>
+              </a:rPr>
+              <a:t>Current pricing: 24.50p per kWh</a:t>
+            </a:r>
+          </a:p>
+          <a:p>
+            <a:r>
+              <a:rPr lang="en-US" dirty="0">
+                <a:latin typeface="Century Schoolbook" panose="02040604050505020304" pitchFamily="18" charset="0"/>
+              </a:rPr>
+              <a:t>Recommended peak pricing: 30p per kWh (22.45% increase)</a:t>
+            </a:r>
+          </a:p>
+          <a:p>
+            <a:r>
+              <a:rPr lang="en-US" dirty="0">
+                <a:latin typeface="Century Schoolbook" panose="02040604050505020304" pitchFamily="18" charset="0"/>
+              </a:rPr>
+              <a:t>Price demand elasticity for electricity: −0.607 (for every 1 percent increase in electricity price, demand decreases by 0.607%)</a:t>
+            </a:r>
+          </a:p>
+          <a:p>
+            <a:pPr lvl="1"/>
+            <a:r>
+              <a:rPr lang="en-US" dirty="0">
+                <a:latin typeface="Century Schoolbook" panose="02040604050505020304" pitchFamily="18" charset="0"/>
+              </a:rPr>
+              <a:t>Estimated to reduce demand during peak priced hours by 13.63%</a:t>
+            </a:r>
+          </a:p>
+          <a:p>
+            <a:pPr lvl="1"/>
+            <a:endParaRPr lang="en-US" dirty="0">
+              <a:latin typeface="Century Schoolbook" panose="02040604050505020304" pitchFamily="18" charset="0"/>
+            </a:endParaRPr>
+          </a:p>
+          <a:p>
+            <a:pPr lvl="1"/>
             <a:endParaRPr lang="en-US" dirty="0">
               <a:latin typeface="Century Schoolbook" panose="02040604050505020304" pitchFamily="18" charset="0"/>
             </a:endParaRPr>
@@ -4195,6 +4348,147 @@
     <p:extLst>
       <p:ext uri="{BB962C8B-B14F-4D97-AF65-F5344CB8AC3E}">
         <p14:creationId xmlns:p14="http://schemas.microsoft.com/office/powerpoint/2010/main" val="3920395960"/>
+      </p:ext>
+    </p:extLst>
+  </p:cSld>
+  <p:clrMapOvr>
+    <a:masterClrMapping/>
+  </p:clrMapOvr>
+</p:sld>
+</file>
+
+<file path=ppt/slides/slide7.xml><?xml version="1.0" encoding="utf-8"?>
+<p:sld xmlns:a="http://schemas.openxmlformats.org/drawingml/2006/main" xmlns:r="http://schemas.openxmlformats.org/officeDocument/2006/relationships" xmlns:p="http://schemas.openxmlformats.org/presentationml/2006/main">
+  <p:cSld>
+    <p:spTree>
+      <p:nvGrpSpPr>
+        <p:cNvPr id="1" name=""/>
+        <p:cNvGrpSpPr/>
+        <p:nvPr/>
+      </p:nvGrpSpPr>
+      <p:grpSpPr>
+        <a:xfrm>
+          <a:off x="0" y="0"/>
+          <a:ext cx="0" cy="0"/>
+          <a:chOff x="0" y="0"/>
+          <a:chExt cx="0" cy="0"/>
+        </a:xfrm>
+      </p:grpSpPr>
+      <p:sp>
+        <p:nvSpPr>
+          <p:cNvPr id="2" name="Title 1">
+            <a:extLst>
+              <a:ext uri="{FF2B5EF4-FFF2-40B4-BE49-F238E27FC236}">
+                <a16:creationId xmlns:a16="http://schemas.microsoft.com/office/drawing/2014/main" id="{CC12B01E-DA83-918F-9770-400EA1DB6321}"/>
+              </a:ext>
+            </a:extLst>
+          </p:cNvPr>
+          <p:cNvSpPr>
+            <a:spLocks noGrp="1"/>
+          </p:cNvSpPr>
+          <p:nvPr>
+            <p:ph type="title"/>
+          </p:nvPr>
+        </p:nvSpPr>
+        <p:spPr/>
+        <p:txBody>
+          <a:bodyPr/>
+          <a:lstStyle/>
+          <a:p>
+            <a:r>
+              <a:rPr lang="en-US" dirty="0">
+                <a:latin typeface="Century Schoolbook" panose="02040604050505020304" pitchFamily="18" charset="0"/>
+              </a:rPr>
+              <a:t>Potential Improvements</a:t>
+            </a:r>
+          </a:p>
+        </p:txBody>
+      </p:sp>
+      <p:sp>
+        <p:nvSpPr>
+          <p:cNvPr id="3" name="Content Placeholder 2">
+            <a:extLst>
+              <a:ext uri="{FF2B5EF4-FFF2-40B4-BE49-F238E27FC236}">
+                <a16:creationId xmlns:a16="http://schemas.microsoft.com/office/drawing/2014/main" id="{D4E77A62-7133-76B5-F536-C67A5AA8F2E0}"/>
+              </a:ext>
+            </a:extLst>
+          </p:cNvPr>
+          <p:cNvSpPr>
+            <a:spLocks noGrp="1"/>
+          </p:cNvSpPr>
+          <p:nvPr>
+            <p:ph idx="1"/>
+          </p:nvPr>
+        </p:nvSpPr>
+        <p:spPr/>
+        <p:txBody>
+          <a:bodyPr/>
+          <a:lstStyle/>
+          <a:p>
+            <a:r>
+              <a:rPr lang="en-US" dirty="0">
+                <a:latin typeface="Century Schoolbook" panose="02040604050505020304" pitchFamily="18" charset="0"/>
+              </a:rPr>
+              <a:t>Study percentiles of consumption</a:t>
+            </a:r>
+          </a:p>
+          <a:p>
+            <a:pPr lvl="1"/>
+            <a:r>
+              <a:rPr lang="en-US" dirty="0">
+                <a:latin typeface="Century Schoolbook" panose="02040604050505020304" pitchFamily="18" charset="0"/>
+              </a:rPr>
+              <a:t>We can put additional pricing on the top X% of consumers during peak hours</a:t>
+            </a:r>
+          </a:p>
+          <a:p>
+            <a:r>
+              <a:rPr lang="en-US" dirty="0">
+                <a:latin typeface="Century Schoolbook" panose="02040604050505020304" pitchFamily="18" charset="0"/>
+              </a:rPr>
+              <a:t>Understand variability by day of the week</a:t>
+            </a:r>
+          </a:p>
+          <a:p>
+            <a:pPr lvl="1"/>
+            <a:r>
+              <a:rPr lang="en-US">
+                <a:latin typeface="Century Schoolbook" panose="02040604050505020304" pitchFamily="18" charset="0"/>
+              </a:rPr>
+              <a:t>Should peak pricing be different on weekdays vs weekends?</a:t>
+            </a:r>
+            <a:endParaRPr lang="en-US" dirty="0">
+              <a:latin typeface="Century Schoolbook" panose="02040604050505020304" pitchFamily="18" charset="0"/>
+            </a:endParaRPr>
+          </a:p>
+          <a:p>
+            <a:r>
+              <a:rPr lang="en-US" dirty="0">
+                <a:latin typeface="Century Schoolbook" panose="02040604050505020304" pitchFamily="18" charset="0"/>
+              </a:rPr>
+              <a:t>Add demographic variability, i.e. income, to study various consumption rates</a:t>
+            </a:r>
+          </a:p>
+          <a:p>
+            <a:pPr lvl="1"/>
+            <a:r>
+              <a:rPr lang="en-US" dirty="0">
+                <a:latin typeface="Century Schoolbook" panose="02040604050505020304" pitchFamily="18" charset="0"/>
+              </a:rPr>
+              <a:t>We can better understand where more people are consuming and do income-based pricing</a:t>
+            </a:r>
+          </a:p>
+          <a:p>
+            <a:endParaRPr lang="en-US" dirty="0">
+              <a:latin typeface="Century Schoolbook" panose="02040604050505020304" pitchFamily="18" charset="0"/>
+            </a:endParaRPr>
+          </a:p>
+        </p:txBody>
+      </p:sp>
+    </p:spTree>
+    <p:extLst>
+      <p:ext uri="{BB962C8B-B14F-4D97-AF65-F5344CB8AC3E}">
+        <p14:creationId xmlns:p14="http://schemas.microsoft.com/office/powerpoint/2010/main" val="3991349698"/>
       </p:ext>
     </p:extLst>
   </p:cSld>

</xml_diff>

<commit_message>
finalize pdf and html
</commit_message>
<xml_diff>
--- a/Presentation.pptx
+++ b/Presentation.pptx
@@ -423,7 +423,7 @@
           <p:cNvPr id="2" name="Title 1">
             <a:extLst>
               <a:ext uri="{FF2B5EF4-FFF2-40B4-BE49-F238E27FC236}">
-                <a16:creationId xmlns:a16="http://schemas.microsoft.com/office/drawing/2014/main" id="{320B1A0F-321C-5777-3BEA-3D207A5A3183}"/>
+                <a16:creationId xmlns:a16="http://schemas.microsoft.com/office/drawing/2014/main" xmlns="" id="{320B1A0F-321C-5777-3BEA-3D207A5A3183}"/>
               </a:ext>
             </a:extLst>
           </p:cNvPr>
@@ -460,7 +460,7 @@
           <p:cNvPr id="3" name="Subtitle 2">
             <a:extLst>
               <a:ext uri="{FF2B5EF4-FFF2-40B4-BE49-F238E27FC236}">
-                <a16:creationId xmlns:a16="http://schemas.microsoft.com/office/drawing/2014/main" id="{28B25D15-A8A5-391C-725F-E261026155FE}"/>
+                <a16:creationId xmlns:a16="http://schemas.microsoft.com/office/drawing/2014/main" xmlns="" id="{28B25D15-A8A5-391C-725F-E261026155FE}"/>
               </a:ext>
             </a:extLst>
           </p:cNvPr>
@@ -530,7 +530,7 @@
           <p:cNvPr id="4" name="Date Placeholder 3">
             <a:extLst>
               <a:ext uri="{FF2B5EF4-FFF2-40B4-BE49-F238E27FC236}">
-                <a16:creationId xmlns:a16="http://schemas.microsoft.com/office/drawing/2014/main" id="{1FA4A0CA-27D2-F4A1-39DF-804DF078C438}"/>
+                <a16:creationId xmlns:a16="http://schemas.microsoft.com/office/drawing/2014/main" xmlns="" id="{1FA4A0CA-27D2-F4A1-39DF-804DF078C438}"/>
               </a:ext>
             </a:extLst>
           </p:cNvPr>
@@ -559,7 +559,7 @@
           <p:cNvPr id="5" name="Footer Placeholder 4">
             <a:extLst>
               <a:ext uri="{FF2B5EF4-FFF2-40B4-BE49-F238E27FC236}">
-                <a16:creationId xmlns:a16="http://schemas.microsoft.com/office/drawing/2014/main" id="{EBFFFA97-A9D1-29C8-6ABF-FFC4A08F9282}"/>
+                <a16:creationId xmlns:a16="http://schemas.microsoft.com/office/drawing/2014/main" xmlns="" id="{EBFFFA97-A9D1-29C8-6ABF-FFC4A08F9282}"/>
               </a:ext>
             </a:extLst>
           </p:cNvPr>
@@ -584,7 +584,7 @@
           <p:cNvPr id="6" name="Slide Number Placeholder 5">
             <a:extLst>
               <a:ext uri="{FF2B5EF4-FFF2-40B4-BE49-F238E27FC236}">
-                <a16:creationId xmlns:a16="http://schemas.microsoft.com/office/drawing/2014/main" id="{A55561DA-E448-3676-1551-A1CC91B7D222}"/>
+                <a16:creationId xmlns:a16="http://schemas.microsoft.com/office/drawing/2014/main" xmlns="" id="{A55561DA-E448-3676-1551-A1CC91B7D222}"/>
               </a:ext>
             </a:extLst>
           </p:cNvPr>
@@ -643,7 +643,7 @@
           <p:cNvPr id="2" name="Title 1">
             <a:extLst>
               <a:ext uri="{FF2B5EF4-FFF2-40B4-BE49-F238E27FC236}">
-                <a16:creationId xmlns:a16="http://schemas.microsoft.com/office/drawing/2014/main" id="{EFD91BBC-F8EF-7180-B665-DABA2F53F3DD}"/>
+                <a16:creationId xmlns:a16="http://schemas.microsoft.com/office/drawing/2014/main" xmlns="" id="{EFD91BBC-F8EF-7180-B665-DABA2F53F3DD}"/>
               </a:ext>
             </a:extLst>
           </p:cNvPr>
@@ -671,7 +671,7 @@
           <p:cNvPr id="3" name="Vertical Text Placeholder 2">
             <a:extLst>
               <a:ext uri="{FF2B5EF4-FFF2-40B4-BE49-F238E27FC236}">
-                <a16:creationId xmlns:a16="http://schemas.microsoft.com/office/drawing/2014/main" id="{D877427C-3BDF-0B49-4C0C-77B7D8E03700}"/>
+                <a16:creationId xmlns:a16="http://schemas.microsoft.com/office/drawing/2014/main" xmlns="" id="{D877427C-3BDF-0B49-4C0C-77B7D8E03700}"/>
               </a:ext>
             </a:extLst>
           </p:cNvPr>
@@ -728,7 +728,7 @@
           <p:cNvPr id="4" name="Date Placeholder 3">
             <a:extLst>
               <a:ext uri="{FF2B5EF4-FFF2-40B4-BE49-F238E27FC236}">
-                <a16:creationId xmlns:a16="http://schemas.microsoft.com/office/drawing/2014/main" id="{F5D40DD8-FD2A-CAEB-A3FD-A47113D8CC61}"/>
+                <a16:creationId xmlns:a16="http://schemas.microsoft.com/office/drawing/2014/main" xmlns="" id="{F5D40DD8-FD2A-CAEB-A3FD-A47113D8CC61}"/>
               </a:ext>
             </a:extLst>
           </p:cNvPr>
@@ -757,7 +757,7 @@
           <p:cNvPr id="5" name="Footer Placeholder 4">
             <a:extLst>
               <a:ext uri="{FF2B5EF4-FFF2-40B4-BE49-F238E27FC236}">
-                <a16:creationId xmlns:a16="http://schemas.microsoft.com/office/drawing/2014/main" id="{2D9282D4-534A-0DBF-9AB5-73000BF246FA}"/>
+                <a16:creationId xmlns:a16="http://schemas.microsoft.com/office/drawing/2014/main" xmlns="" id="{2D9282D4-534A-0DBF-9AB5-73000BF246FA}"/>
               </a:ext>
             </a:extLst>
           </p:cNvPr>
@@ -782,7 +782,7 @@
           <p:cNvPr id="6" name="Slide Number Placeholder 5">
             <a:extLst>
               <a:ext uri="{FF2B5EF4-FFF2-40B4-BE49-F238E27FC236}">
-                <a16:creationId xmlns:a16="http://schemas.microsoft.com/office/drawing/2014/main" id="{FA485131-4139-4C56-580E-A52C9792587D}"/>
+                <a16:creationId xmlns:a16="http://schemas.microsoft.com/office/drawing/2014/main" xmlns="" id="{FA485131-4139-4C56-580E-A52C9792587D}"/>
               </a:ext>
             </a:extLst>
           </p:cNvPr>
@@ -841,7 +841,7 @@
           <p:cNvPr id="2" name="Vertical Title 1">
             <a:extLst>
               <a:ext uri="{FF2B5EF4-FFF2-40B4-BE49-F238E27FC236}">
-                <a16:creationId xmlns:a16="http://schemas.microsoft.com/office/drawing/2014/main" id="{5030D4D7-9DE4-75B4-6ABD-84751E8ECBAE}"/>
+                <a16:creationId xmlns:a16="http://schemas.microsoft.com/office/drawing/2014/main" xmlns="" id="{5030D4D7-9DE4-75B4-6ABD-84751E8ECBAE}"/>
               </a:ext>
             </a:extLst>
           </p:cNvPr>
@@ -874,7 +874,7 @@
           <p:cNvPr id="3" name="Vertical Text Placeholder 2">
             <a:extLst>
               <a:ext uri="{FF2B5EF4-FFF2-40B4-BE49-F238E27FC236}">
-                <a16:creationId xmlns:a16="http://schemas.microsoft.com/office/drawing/2014/main" id="{88B07BC1-0FC3-D87F-E4E9-CDC32033494A}"/>
+                <a16:creationId xmlns:a16="http://schemas.microsoft.com/office/drawing/2014/main" xmlns="" id="{88B07BC1-0FC3-D87F-E4E9-CDC32033494A}"/>
               </a:ext>
             </a:extLst>
           </p:cNvPr>
@@ -936,7 +936,7 @@
           <p:cNvPr id="4" name="Date Placeholder 3">
             <a:extLst>
               <a:ext uri="{FF2B5EF4-FFF2-40B4-BE49-F238E27FC236}">
-                <a16:creationId xmlns:a16="http://schemas.microsoft.com/office/drawing/2014/main" id="{7D9C7361-12C2-ADE9-EE6E-49AF49F04FAC}"/>
+                <a16:creationId xmlns:a16="http://schemas.microsoft.com/office/drawing/2014/main" xmlns="" id="{7D9C7361-12C2-ADE9-EE6E-49AF49F04FAC}"/>
               </a:ext>
             </a:extLst>
           </p:cNvPr>
@@ -965,7 +965,7 @@
           <p:cNvPr id="5" name="Footer Placeholder 4">
             <a:extLst>
               <a:ext uri="{FF2B5EF4-FFF2-40B4-BE49-F238E27FC236}">
-                <a16:creationId xmlns:a16="http://schemas.microsoft.com/office/drawing/2014/main" id="{109A6931-B5A6-97D2-FBF8-39B86919378B}"/>
+                <a16:creationId xmlns:a16="http://schemas.microsoft.com/office/drawing/2014/main" xmlns="" id="{109A6931-B5A6-97D2-FBF8-39B86919378B}"/>
               </a:ext>
             </a:extLst>
           </p:cNvPr>
@@ -990,7 +990,7 @@
           <p:cNvPr id="6" name="Slide Number Placeholder 5">
             <a:extLst>
               <a:ext uri="{FF2B5EF4-FFF2-40B4-BE49-F238E27FC236}">
-                <a16:creationId xmlns:a16="http://schemas.microsoft.com/office/drawing/2014/main" id="{B6664938-38C8-5BF3-D7F0-7322842D7B91}"/>
+                <a16:creationId xmlns:a16="http://schemas.microsoft.com/office/drawing/2014/main" xmlns="" id="{B6664938-38C8-5BF3-D7F0-7322842D7B91}"/>
               </a:ext>
             </a:extLst>
           </p:cNvPr>
@@ -1049,7 +1049,7 @@
           <p:cNvPr id="2" name="Title 1">
             <a:extLst>
               <a:ext uri="{FF2B5EF4-FFF2-40B4-BE49-F238E27FC236}">
-                <a16:creationId xmlns:a16="http://schemas.microsoft.com/office/drawing/2014/main" id="{B8BFDCA9-BEFD-123B-C270-51C823EBC908}"/>
+                <a16:creationId xmlns:a16="http://schemas.microsoft.com/office/drawing/2014/main" xmlns="" id="{B8BFDCA9-BEFD-123B-C270-51C823EBC908}"/>
               </a:ext>
             </a:extLst>
           </p:cNvPr>
@@ -1077,7 +1077,7 @@
           <p:cNvPr id="3" name="Content Placeholder 2">
             <a:extLst>
               <a:ext uri="{FF2B5EF4-FFF2-40B4-BE49-F238E27FC236}">
-                <a16:creationId xmlns:a16="http://schemas.microsoft.com/office/drawing/2014/main" id="{871C3F33-C6B4-19BC-9B09-BB4E6F478A64}"/>
+                <a16:creationId xmlns:a16="http://schemas.microsoft.com/office/drawing/2014/main" xmlns="" id="{871C3F33-C6B4-19BC-9B09-BB4E6F478A64}"/>
               </a:ext>
             </a:extLst>
           </p:cNvPr>
@@ -1134,7 +1134,7 @@
           <p:cNvPr id="4" name="Date Placeholder 3">
             <a:extLst>
               <a:ext uri="{FF2B5EF4-FFF2-40B4-BE49-F238E27FC236}">
-                <a16:creationId xmlns:a16="http://schemas.microsoft.com/office/drawing/2014/main" id="{59915196-111C-69AD-6D26-FF09FE2F24DA}"/>
+                <a16:creationId xmlns:a16="http://schemas.microsoft.com/office/drawing/2014/main" xmlns="" id="{59915196-111C-69AD-6D26-FF09FE2F24DA}"/>
               </a:ext>
             </a:extLst>
           </p:cNvPr>
@@ -1163,7 +1163,7 @@
           <p:cNvPr id="5" name="Footer Placeholder 4">
             <a:extLst>
               <a:ext uri="{FF2B5EF4-FFF2-40B4-BE49-F238E27FC236}">
-                <a16:creationId xmlns:a16="http://schemas.microsoft.com/office/drawing/2014/main" id="{6962378E-0DAE-1E79-376A-94AD06A26320}"/>
+                <a16:creationId xmlns:a16="http://schemas.microsoft.com/office/drawing/2014/main" xmlns="" id="{6962378E-0DAE-1E79-376A-94AD06A26320}"/>
               </a:ext>
             </a:extLst>
           </p:cNvPr>
@@ -1188,7 +1188,7 @@
           <p:cNvPr id="6" name="Slide Number Placeholder 5">
             <a:extLst>
               <a:ext uri="{FF2B5EF4-FFF2-40B4-BE49-F238E27FC236}">
-                <a16:creationId xmlns:a16="http://schemas.microsoft.com/office/drawing/2014/main" id="{47E7CA39-B45E-8AC4-AF66-8A4AED5A957B}"/>
+                <a16:creationId xmlns:a16="http://schemas.microsoft.com/office/drawing/2014/main" xmlns="" id="{47E7CA39-B45E-8AC4-AF66-8A4AED5A957B}"/>
               </a:ext>
             </a:extLst>
           </p:cNvPr>
@@ -1247,7 +1247,7 @@
           <p:cNvPr id="2" name="Title 1">
             <a:extLst>
               <a:ext uri="{FF2B5EF4-FFF2-40B4-BE49-F238E27FC236}">
-                <a16:creationId xmlns:a16="http://schemas.microsoft.com/office/drawing/2014/main" id="{61F0E989-C1F2-AC99-6D06-5E34C308D282}"/>
+                <a16:creationId xmlns:a16="http://schemas.microsoft.com/office/drawing/2014/main" xmlns="" id="{61F0E989-C1F2-AC99-6D06-5E34C308D282}"/>
               </a:ext>
             </a:extLst>
           </p:cNvPr>
@@ -1284,7 +1284,7 @@
           <p:cNvPr id="3" name="Text Placeholder 2">
             <a:extLst>
               <a:ext uri="{FF2B5EF4-FFF2-40B4-BE49-F238E27FC236}">
-                <a16:creationId xmlns:a16="http://schemas.microsoft.com/office/drawing/2014/main" id="{5A439BAB-6C85-1547-CC50-CAB21C4618DA}"/>
+                <a16:creationId xmlns:a16="http://schemas.microsoft.com/office/drawing/2014/main" xmlns="" id="{5A439BAB-6C85-1547-CC50-CAB21C4618DA}"/>
               </a:ext>
             </a:extLst>
           </p:cNvPr>
@@ -1409,7 +1409,7 @@
           <p:cNvPr id="4" name="Date Placeholder 3">
             <a:extLst>
               <a:ext uri="{FF2B5EF4-FFF2-40B4-BE49-F238E27FC236}">
-                <a16:creationId xmlns:a16="http://schemas.microsoft.com/office/drawing/2014/main" id="{4B9B18D5-6494-C5EA-72E3-1B7347F06C81}"/>
+                <a16:creationId xmlns:a16="http://schemas.microsoft.com/office/drawing/2014/main" xmlns="" id="{4B9B18D5-6494-C5EA-72E3-1B7347F06C81}"/>
               </a:ext>
             </a:extLst>
           </p:cNvPr>
@@ -1438,7 +1438,7 @@
           <p:cNvPr id="5" name="Footer Placeholder 4">
             <a:extLst>
               <a:ext uri="{FF2B5EF4-FFF2-40B4-BE49-F238E27FC236}">
-                <a16:creationId xmlns:a16="http://schemas.microsoft.com/office/drawing/2014/main" id="{C67942A4-64A3-29E1-065F-D7B8C4643856}"/>
+                <a16:creationId xmlns:a16="http://schemas.microsoft.com/office/drawing/2014/main" xmlns="" id="{C67942A4-64A3-29E1-065F-D7B8C4643856}"/>
               </a:ext>
             </a:extLst>
           </p:cNvPr>
@@ -1463,7 +1463,7 @@
           <p:cNvPr id="6" name="Slide Number Placeholder 5">
             <a:extLst>
               <a:ext uri="{FF2B5EF4-FFF2-40B4-BE49-F238E27FC236}">
-                <a16:creationId xmlns:a16="http://schemas.microsoft.com/office/drawing/2014/main" id="{49E69011-937A-B49B-B2A8-7C52B56193D2}"/>
+                <a16:creationId xmlns:a16="http://schemas.microsoft.com/office/drawing/2014/main" xmlns="" id="{49E69011-937A-B49B-B2A8-7C52B56193D2}"/>
               </a:ext>
             </a:extLst>
           </p:cNvPr>
@@ -1522,7 +1522,7 @@
           <p:cNvPr id="2" name="Title 1">
             <a:extLst>
               <a:ext uri="{FF2B5EF4-FFF2-40B4-BE49-F238E27FC236}">
-                <a16:creationId xmlns:a16="http://schemas.microsoft.com/office/drawing/2014/main" id="{2DD273AE-0E0E-C85A-5DD5-30135677A3C0}"/>
+                <a16:creationId xmlns:a16="http://schemas.microsoft.com/office/drawing/2014/main" xmlns="" id="{2DD273AE-0E0E-C85A-5DD5-30135677A3C0}"/>
               </a:ext>
             </a:extLst>
           </p:cNvPr>
@@ -1550,7 +1550,7 @@
           <p:cNvPr id="3" name="Content Placeholder 2">
             <a:extLst>
               <a:ext uri="{FF2B5EF4-FFF2-40B4-BE49-F238E27FC236}">
-                <a16:creationId xmlns:a16="http://schemas.microsoft.com/office/drawing/2014/main" id="{C7044928-E5BA-5116-7723-F4B6E87243F9}"/>
+                <a16:creationId xmlns:a16="http://schemas.microsoft.com/office/drawing/2014/main" xmlns="" id="{C7044928-E5BA-5116-7723-F4B6E87243F9}"/>
               </a:ext>
             </a:extLst>
           </p:cNvPr>
@@ -1612,7 +1612,7 @@
           <p:cNvPr id="4" name="Content Placeholder 3">
             <a:extLst>
               <a:ext uri="{FF2B5EF4-FFF2-40B4-BE49-F238E27FC236}">
-                <a16:creationId xmlns:a16="http://schemas.microsoft.com/office/drawing/2014/main" id="{F50E6347-234C-6AC6-480F-7A81A456A58A}"/>
+                <a16:creationId xmlns:a16="http://schemas.microsoft.com/office/drawing/2014/main" xmlns="" id="{F50E6347-234C-6AC6-480F-7A81A456A58A}"/>
               </a:ext>
             </a:extLst>
           </p:cNvPr>
@@ -1674,7 +1674,7 @@
           <p:cNvPr id="5" name="Date Placeholder 4">
             <a:extLst>
               <a:ext uri="{FF2B5EF4-FFF2-40B4-BE49-F238E27FC236}">
-                <a16:creationId xmlns:a16="http://schemas.microsoft.com/office/drawing/2014/main" id="{A5320CE0-32BB-C464-CA2A-8EBEBD03B34C}"/>
+                <a16:creationId xmlns:a16="http://schemas.microsoft.com/office/drawing/2014/main" xmlns="" id="{A5320CE0-32BB-C464-CA2A-8EBEBD03B34C}"/>
               </a:ext>
             </a:extLst>
           </p:cNvPr>
@@ -1703,7 +1703,7 @@
           <p:cNvPr id="6" name="Footer Placeholder 5">
             <a:extLst>
               <a:ext uri="{FF2B5EF4-FFF2-40B4-BE49-F238E27FC236}">
-                <a16:creationId xmlns:a16="http://schemas.microsoft.com/office/drawing/2014/main" id="{EF7C82E4-6B19-6DD8-D84A-E128B2CC044C}"/>
+                <a16:creationId xmlns:a16="http://schemas.microsoft.com/office/drawing/2014/main" xmlns="" id="{EF7C82E4-6B19-6DD8-D84A-E128B2CC044C}"/>
               </a:ext>
             </a:extLst>
           </p:cNvPr>
@@ -1728,7 +1728,7 @@
           <p:cNvPr id="7" name="Slide Number Placeholder 6">
             <a:extLst>
               <a:ext uri="{FF2B5EF4-FFF2-40B4-BE49-F238E27FC236}">
-                <a16:creationId xmlns:a16="http://schemas.microsoft.com/office/drawing/2014/main" id="{70925D21-53FC-3918-4AD2-627B49480659}"/>
+                <a16:creationId xmlns:a16="http://schemas.microsoft.com/office/drawing/2014/main" xmlns="" id="{70925D21-53FC-3918-4AD2-627B49480659}"/>
               </a:ext>
             </a:extLst>
           </p:cNvPr>
@@ -1787,7 +1787,7 @@
           <p:cNvPr id="2" name="Title 1">
             <a:extLst>
               <a:ext uri="{FF2B5EF4-FFF2-40B4-BE49-F238E27FC236}">
-                <a16:creationId xmlns:a16="http://schemas.microsoft.com/office/drawing/2014/main" id="{81C75CCF-BA9F-2E2A-42E8-7F67121FAC7F}"/>
+                <a16:creationId xmlns:a16="http://schemas.microsoft.com/office/drawing/2014/main" xmlns="" id="{81C75CCF-BA9F-2E2A-42E8-7F67121FAC7F}"/>
               </a:ext>
             </a:extLst>
           </p:cNvPr>
@@ -1820,7 +1820,7 @@
           <p:cNvPr id="3" name="Text Placeholder 2">
             <a:extLst>
               <a:ext uri="{FF2B5EF4-FFF2-40B4-BE49-F238E27FC236}">
-                <a16:creationId xmlns:a16="http://schemas.microsoft.com/office/drawing/2014/main" id="{F35449DC-74E7-B672-B1A2-63B676877768}"/>
+                <a16:creationId xmlns:a16="http://schemas.microsoft.com/office/drawing/2014/main" xmlns="" id="{F35449DC-74E7-B672-B1A2-63B676877768}"/>
               </a:ext>
             </a:extLst>
           </p:cNvPr>
@@ -1891,7 +1891,7 @@
           <p:cNvPr id="4" name="Content Placeholder 3">
             <a:extLst>
               <a:ext uri="{FF2B5EF4-FFF2-40B4-BE49-F238E27FC236}">
-                <a16:creationId xmlns:a16="http://schemas.microsoft.com/office/drawing/2014/main" id="{FE7CF35D-F1AA-DF87-607A-4B9739E540E9}"/>
+                <a16:creationId xmlns:a16="http://schemas.microsoft.com/office/drawing/2014/main" xmlns="" id="{FE7CF35D-F1AA-DF87-607A-4B9739E540E9}"/>
               </a:ext>
             </a:extLst>
           </p:cNvPr>
@@ -1953,7 +1953,7 @@
           <p:cNvPr id="5" name="Text Placeholder 4">
             <a:extLst>
               <a:ext uri="{FF2B5EF4-FFF2-40B4-BE49-F238E27FC236}">
-                <a16:creationId xmlns:a16="http://schemas.microsoft.com/office/drawing/2014/main" id="{7A412A79-2EA5-59F8-9549-070C030ED304}"/>
+                <a16:creationId xmlns:a16="http://schemas.microsoft.com/office/drawing/2014/main" xmlns="" id="{7A412A79-2EA5-59F8-9549-070C030ED304}"/>
               </a:ext>
             </a:extLst>
           </p:cNvPr>
@@ -2024,7 +2024,7 @@
           <p:cNvPr id="6" name="Content Placeholder 5">
             <a:extLst>
               <a:ext uri="{FF2B5EF4-FFF2-40B4-BE49-F238E27FC236}">
-                <a16:creationId xmlns:a16="http://schemas.microsoft.com/office/drawing/2014/main" id="{22921607-854E-6101-95A1-CCEF7E3B18AE}"/>
+                <a16:creationId xmlns:a16="http://schemas.microsoft.com/office/drawing/2014/main" xmlns="" id="{22921607-854E-6101-95A1-CCEF7E3B18AE}"/>
               </a:ext>
             </a:extLst>
           </p:cNvPr>
@@ -2086,7 +2086,7 @@
           <p:cNvPr id="7" name="Date Placeholder 6">
             <a:extLst>
               <a:ext uri="{FF2B5EF4-FFF2-40B4-BE49-F238E27FC236}">
-                <a16:creationId xmlns:a16="http://schemas.microsoft.com/office/drawing/2014/main" id="{C35453DC-5B70-FA23-46AD-509B1CF74629}"/>
+                <a16:creationId xmlns:a16="http://schemas.microsoft.com/office/drawing/2014/main" xmlns="" id="{C35453DC-5B70-FA23-46AD-509B1CF74629}"/>
               </a:ext>
             </a:extLst>
           </p:cNvPr>
@@ -2115,7 +2115,7 @@
           <p:cNvPr id="8" name="Footer Placeholder 7">
             <a:extLst>
               <a:ext uri="{FF2B5EF4-FFF2-40B4-BE49-F238E27FC236}">
-                <a16:creationId xmlns:a16="http://schemas.microsoft.com/office/drawing/2014/main" id="{259EF3ED-F94F-3F76-20A4-4F272B989137}"/>
+                <a16:creationId xmlns:a16="http://schemas.microsoft.com/office/drawing/2014/main" xmlns="" id="{259EF3ED-F94F-3F76-20A4-4F272B989137}"/>
               </a:ext>
             </a:extLst>
           </p:cNvPr>
@@ -2140,7 +2140,7 @@
           <p:cNvPr id="9" name="Slide Number Placeholder 8">
             <a:extLst>
               <a:ext uri="{FF2B5EF4-FFF2-40B4-BE49-F238E27FC236}">
-                <a16:creationId xmlns:a16="http://schemas.microsoft.com/office/drawing/2014/main" id="{0134FBDD-EDFC-B87D-42A4-1E83A7E36E16}"/>
+                <a16:creationId xmlns:a16="http://schemas.microsoft.com/office/drawing/2014/main" xmlns="" id="{0134FBDD-EDFC-B87D-42A4-1E83A7E36E16}"/>
               </a:ext>
             </a:extLst>
           </p:cNvPr>
@@ -2199,7 +2199,7 @@
           <p:cNvPr id="2" name="Title 1">
             <a:extLst>
               <a:ext uri="{FF2B5EF4-FFF2-40B4-BE49-F238E27FC236}">
-                <a16:creationId xmlns:a16="http://schemas.microsoft.com/office/drawing/2014/main" id="{37215CB4-48CD-60FF-8E2B-42C3CDE5EBB5}"/>
+                <a16:creationId xmlns:a16="http://schemas.microsoft.com/office/drawing/2014/main" xmlns="" id="{37215CB4-48CD-60FF-8E2B-42C3CDE5EBB5}"/>
               </a:ext>
             </a:extLst>
           </p:cNvPr>
@@ -2227,7 +2227,7 @@
           <p:cNvPr id="3" name="Date Placeholder 2">
             <a:extLst>
               <a:ext uri="{FF2B5EF4-FFF2-40B4-BE49-F238E27FC236}">
-                <a16:creationId xmlns:a16="http://schemas.microsoft.com/office/drawing/2014/main" id="{3A61061D-DB1B-D03E-D781-58D292A6AB0E}"/>
+                <a16:creationId xmlns:a16="http://schemas.microsoft.com/office/drawing/2014/main" xmlns="" id="{3A61061D-DB1B-D03E-D781-58D292A6AB0E}"/>
               </a:ext>
             </a:extLst>
           </p:cNvPr>
@@ -2256,7 +2256,7 @@
           <p:cNvPr id="4" name="Footer Placeholder 3">
             <a:extLst>
               <a:ext uri="{FF2B5EF4-FFF2-40B4-BE49-F238E27FC236}">
-                <a16:creationId xmlns:a16="http://schemas.microsoft.com/office/drawing/2014/main" id="{AB0BC054-1F90-698F-D8C5-DF4552F477F4}"/>
+                <a16:creationId xmlns:a16="http://schemas.microsoft.com/office/drawing/2014/main" xmlns="" id="{AB0BC054-1F90-698F-D8C5-DF4552F477F4}"/>
               </a:ext>
             </a:extLst>
           </p:cNvPr>
@@ -2281,7 +2281,7 @@
           <p:cNvPr id="5" name="Slide Number Placeholder 4">
             <a:extLst>
               <a:ext uri="{FF2B5EF4-FFF2-40B4-BE49-F238E27FC236}">
-                <a16:creationId xmlns:a16="http://schemas.microsoft.com/office/drawing/2014/main" id="{DB57AFBF-40C6-EA91-B858-3AC2843D3F84}"/>
+                <a16:creationId xmlns:a16="http://schemas.microsoft.com/office/drawing/2014/main" xmlns="" id="{DB57AFBF-40C6-EA91-B858-3AC2843D3F84}"/>
               </a:ext>
             </a:extLst>
           </p:cNvPr>
@@ -2340,7 +2340,7 @@
           <p:cNvPr id="2" name="Date Placeholder 1">
             <a:extLst>
               <a:ext uri="{FF2B5EF4-FFF2-40B4-BE49-F238E27FC236}">
-                <a16:creationId xmlns:a16="http://schemas.microsoft.com/office/drawing/2014/main" id="{20A8943E-0EFF-1D08-507D-DEB79DD6D77B}"/>
+                <a16:creationId xmlns:a16="http://schemas.microsoft.com/office/drawing/2014/main" xmlns="" id="{20A8943E-0EFF-1D08-507D-DEB79DD6D77B}"/>
               </a:ext>
             </a:extLst>
           </p:cNvPr>
@@ -2369,7 +2369,7 @@
           <p:cNvPr id="3" name="Footer Placeholder 2">
             <a:extLst>
               <a:ext uri="{FF2B5EF4-FFF2-40B4-BE49-F238E27FC236}">
-                <a16:creationId xmlns:a16="http://schemas.microsoft.com/office/drawing/2014/main" id="{74520656-52FC-F591-891A-506770296F5B}"/>
+                <a16:creationId xmlns:a16="http://schemas.microsoft.com/office/drawing/2014/main" xmlns="" id="{74520656-52FC-F591-891A-506770296F5B}"/>
               </a:ext>
             </a:extLst>
           </p:cNvPr>
@@ -2394,7 +2394,7 @@
           <p:cNvPr id="4" name="Slide Number Placeholder 3">
             <a:extLst>
               <a:ext uri="{FF2B5EF4-FFF2-40B4-BE49-F238E27FC236}">
-                <a16:creationId xmlns:a16="http://schemas.microsoft.com/office/drawing/2014/main" id="{F4054D6B-163C-92C5-0BFA-BA6DB1C9AFA0}"/>
+                <a16:creationId xmlns:a16="http://schemas.microsoft.com/office/drawing/2014/main" xmlns="" id="{F4054D6B-163C-92C5-0BFA-BA6DB1C9AFA0}"/>
               </a:ext>
             </a:extLst>
           </p:cNvPr>
@@ -2453,7 +2453,7 @@
           <p:cNvPr id="2" name="Title 1">
             <a:extLst>
               <a:ext uri="{FF2B5EF4-FFF2-40B4-BE49-F238E27FC236}">
-                <a16:creationId xmlns:a16="http://schemas.microsoft.com/office/drawing/2014/main" id="{9ED6E306-C168-B4E4-892C-4ED7BF549019}"/>
+                <a16:creationId xmlns:a16="http://schemas.microsoft.com/office/drawing/2014/main" xmlns="" id="{9ED6E306-C168-B4E4-892C-4ED7BF549019}"/>
               </a:ext>
             </a:extLst>
           </p:cNvPr>
@@ -2490,7 +2490,7 @@
           <p:cNvPr id="3" name="Content Placeholder 2">
             <a:extLst>
               <a:ext uri="{FF2B5EF4-FFF2-40B4-BE49-F238E27FC236}">
-                <a16:creationId xmlns:a16="http://schemas.microsoft.com/office/drawing/2014/main" id="{D457AF6B-DC22-387A-F9EA-1854832CDB88}"/>
+                <a16:creationId xmlns:a16="http://schemas.microsoft.com/office/drawing/2014/main" xmlns="" id="{D457AF6B-DC22-387A-F9EA-1854832CDB88}"/>
               </a:ext>
             </a:extLst>
           </p:cNvPr>
@@ -2580,7 +2580,7 @@
           <p:cNvPr id="4" name="Text Placeholder 3">
             <a:extLst>
               <a:ext uri="{FF2B5EF4-FFF2-40B4-BE49-F238E27FC236}">
-                <a16:creationId xmlns:a16="http://schemas.microsoft.com/office/drawing/2014/main" id="{741B9A8A-6DCA-5E0E-555B-9F9148C23ED8}"/>
+                <a16:creationId xmlns:a16="http://schemas.microsoft.com/office/drawing/2014/main" xmlns="" id="{741B9A8A-6DCA-5E0E-555B-9F9148C23ED8}"/>
               </a:ext>
             </a:extLst>
           </p:cNvPr>
@@ -2651,7 +2651,7 @@
           <p:cNvPr id="5" name="Date Placeholder 4">
             <a:extLst>
               <a:ext uri="{FF2B5EF4-FFF2-40B4-BE49-F238E27FC236}">
-                <a16:creationId xmlns:a16="http://schemas.microsoft.com/office/drawing/2014/main" id="{6B5A3560-E9D3-B33D-AF43-6FFEB6B4A6A8}"/>
+                <a16:creationId xmlns:a16="http://schemas.microsoft.com/office/drawing/2014/main" xmlns="" id="{6B5A3560-E9D3-B33D-AF43-6FFEB6B4A6A8}"/>
               </a:ext>
             </a:extLst>
           </p:cNvPr>
@@ -2680,7 +2680,7 @@
           <p:cNvPr id="6" name="Footer Placeholder 5">
             <a:extLst>
               <a:ext uri="{FF2B5EF4-FFF2-40B4-BE49-F238E27FC236}">
-                <a16:creationId xmlns:a16="http://schemas.microsoft.com/office/drawing/2014/main" id="{E87B2784-6CF1-D70E-1B90-5381569E37B7}"/>
+                <a16:creationId xmlns:a16="http://schemas.microsoft.com/office/drawing/2014/main" xmlns="" id="{E87B2784-6CF1-D70E-1B90-5381569E37B7}"/>
               </a:ext>
             </a:extLst>
           </p:cNvPr>
@@ -2705,7 +2705,7 @@
           <p:cNvPr id="7" name="Slide Number Placeholder 6">
             <a:extLst>
               <a:ext uri="{FF2B5EF4-FFF2-40B4-BE49-F238E27FC236}">
-                <a16:creationId xmlns:a16="http://schemas.microsoft.com/office/drawing/2014/main" id="{347F0909-6D96-4F8D-2A18-6F328D6849C9}"/>
+                <a16:creationId xmlns:a16="http://schemas.microsoft.com/office/drawing/2014/main" xmlns="" id="{347F0909-6D96-4F8D-2A18-6F328D6849C9}"/>
               </a:ext>
             </a:extLst>
           </p:cNvPr>
@@ -2764,7 +2764,7 @@
           <p:cNvPr id="2" name="Title 1">
             <a:extLst>
               <a:ext uri="{FF2B5EF4-FFF2-40B4-BE49-F238E27FC236}">
-                <a16:creationId xmlns:a16="http://schemas.microsoft.com/office/drawing/2014/main" id="{695FD295-724E-1165-A42C-9194960C782D}"/>
+                <a16:creationId xmlns:a16="http://schemas.microsoft.com/office/drawing/2014/main" xmlns="" id="{695FD295-724E-1165-A42C-9194960C782D}"/>
               </a:ext>
             </a:extLst>
           </p:cNvPr>
@@ -2801,7 +2801,7 @@
           <p:cNvPr id="3" name="Picture Placeholder 2">
             <a:extLst>
               <a:ext uri="{FF2B5EF4-FFF2-40B4-BE49-F238E27FC236}">
-                <a16:creationId xmlns:a16="http://schemas.microsoft.com/office/drawing/2014/main" id="{2461BFB3-44EE-9D7D-8359-CC575FD961F9}"/>
+                <a16:creationId xmlns:a16="http://schemas.microsoft.com/office/drawing/2014/main" xmlns="" id="{2461BFB3-44EE-9D7D-8359-CC575FD961F9}"/>
               </a:ext>
             </a:extLst>
           </p:cNvPr>
@@ -2868,7 +2868,7 @@
           <p:cNvPr id="4" name="Text Placeholder 3">
             <a:extLst>
               <a:ext uri="{FF2B5EF4-FFF2-40B4-BE49-F238E27FC236}">
-                <a16:creationId xmlns:a16="http://schemas.microsoft.com/office/drawing/2014/main" id="{650CC327-FC47-2525-6D77-407870B69809}"/>
+                <a16:creationId xmlns:a16="http://schemas.microsoft.com/office/drawing/2014/main" xmlns="" id="{650CC327-FC47-2525-6D77-407870B69809}"/>
               </a:ext>
             </a:extLst>
           </p:cNvPr>
@@ -2939,7 +2939,7 @@
           <p:cNvPr id="5" name="Date Placeholder 4">
             <a:extLst>
               <a:ext uri="{FF2B5EF4-FFF2-40B4-BE49-F238E27FC236}">
-                <a16:creationId xmlns:a16="http://schemas.microsoft.com/office/drawing/2014/main" id="{7F8859C4-9620-F793-EC52-E5D07859EDA2}"/>
+                <a16:creationId xmlns:a16="http://schemas.microsoft.com/office/drawing/2014/main" xmlns="" id="{7F8859C4-9620-F793-EC52-E5D07859EDA2}"/>
               </a:ext>
             </a:extLst>
           </p:cNvPr>
@@ -2968,7 +2968,7 @@
           <p:cNvPr id="6" name="Footer Placeholder 5">
             <a:extLst>
               <a:ext uri="{FF2B5EF4-FFF2-40B4-BE49-F238E27FC236}">
-                <a16:creationId xmlns:a16="http://schemas.microsoft.com/office/drawing/2014/main" id="{8FFEBA2A-C8D7-80BA-8E09-4A1A58BF2DCB}"/>
+                <a16:creationId xmlns:a16="http://schemas.microsoft.com/office/drawing/2014/main" xmlns="" id="{8FFEBA2A-C8D7-80BA-8E09-4A1A58BF2DCB}"/>
               </a:ext>
             </a:extLst>
           </p:cNvPr>
@@ -2993,7 +2993,7 @@
           <p:cNvPr id="7" name="Slide Number Placeholder 6">
             <a:extLst>
               <a:ext uri="{FF2B5EF4-FFF2-40B4-BE49-F238E27FC236}">
-                <a16:creationId xmlns:a16="http://schemas.microsoft.com/office/drawing/2014/main" id="{9DA73411-76AC-9938-FFA1-EA70AA2CA2F5}"/>
+                <a16:creationId xmlns:a16="http://schemas.microsoft.com/office/drawing/2014/main" xmlns="" id="{9DA73411-76AC-9938-FFA1-EA70AA2CA2F5}"/>
               </a:ext>
             </a:extLst>
           </p:cNvPr>
@@ -3057,7 +3057,7 @@
           <p:cNvPr id="2" name="Title Placeholder 1">
             <a:extLst>
               <a:ext uri="{FF2B5EF4-FFF2-40B4-BE49-F238E27FC236}">
-                <a16:creationId xmlns:a16="http://schemas.microsoft.com/office/drawing/2014/main" id="{5CC1AF9B-212E-75AB-C2F0-9B2083D16FA0}"/>
+                <a16:creationId xmlns:a16="http://schemas.microsoft.com/office/drawing/2014/main" xmlns="" id="{5CC1AF9B-212E-75AB-C2F0-9B2083D16FA0}"/>
               </a:ext>
             </a:extLst>
           </p:cNvPr>
@@ -3095,7 +3095,7 @@
           <p:cNvPr id="3" name="Text Placeholder 2">
             <a:extLst>
               <a:ext uri="{FF2B5EF4-FFF2-40B4-BE49-F238E27FC236}">
-                <a16:creationId xmlns:a16="http://schemas.microsoft.com/office/drawing/2014/main" id="{E5B2605C-2C0A-FCD5-29BB-94807582B31A}"/>
+                <a16:creationId xmlns:a16="http://schemas.microsoft.com/office/drawing/2014/main" xmlns="" id="{E5B2605C-2C0A-FCD5-29BB-94807582B31A}"/>
               </a:ext>
             </a:extLst>
           </p:cNvPr>
@@ -3162,7 +3162,7 @@
           <p:cNvPr id="4" name="Date Placeholder 3">
             <a:extLst>
               <a:ext uri="{FF2B5EF4-FFF2-40B4-BE49-F238E27FC236}">
-                <a16:creationId xmlns:a16="http://schemas.microsoft.com/office/drawing/2014/main" id="{0AAC5A04-FA3B-90E2-3DDC-803F109326AC}"/>
+                <a16:creationId xmlns:a16="http://schemas.microsoft.com/office/drawing/2014/main" xmlns="" id="{0AAC5A04-FA3B-90E2-3DDC-803F109326AC}"/>
               </a:ext>
             </a:extLst>
           </p:cNvPr>
@@ -3209,7 +3209,7 @@
           <p:cNvPr id="5" name="Footer Placeholder 4">
             <a:extLst>
               <a:ext uri="{FF2B5EF4-FFF2-40B4-BE49-F238E27FC236}">
-                <a16:creationId xmlns:a16="http://schemas.microsoft.com/office/drawing/2014/main" id="{48286462-94EF-1F39-AE88-0FD5D811BEB3}"/>
+                <a16:creationId xmlns:a16="http://schemas.microsoft.com/office/drawing/2014/main" xmlns="" id="{48286462-94EF-1F39-AE88-0FD5D811BEB3}"/>
               </a:ext>
             </a:extLst>
           </p:cNvPr>
@@ -3252,7 +3252,7 @@
           <p:cNvPr id="6" name="Slide Number Placeholder 5">
             <a:extLst>
               <a:ext uri="{FF2B5EF4-FFF2-40B4-BE49-F238E27FC236}">
-                <a16:creationId xmlns:a16="http://schemas.microsoft.com/office/drawing/2014/main" id="{902A571E-B839-57D6-EE09-76537C383048}"/>
+                <a16:creationId xmlns:a16="http://schemas.microsoft.com/office/drawing/2014/main" xmlns="" id="{902A571E-B839-57D6-EE09-76537C383048}"/>
               </a:ext>
             </a:extLst>
           </p:cNvPr>
@@ -3620,7 +3620,7 @@
           <p:cNvPr id="2" name="Title 1">
             <a:extLst>
               <a:ext uri="{FF2B5EF4-FFF2-40B4-BE49-F238E27FC236}">
-                <a16:creationId xmlns:a16="http://schemas.microsoft.com/office/drawing/2014/main" id="{56564307-CCFE-C2DA-C3FA-24841BC51525}"/>
+                <a16:creationId xmlns:a16="http://schemas.microsoft.com/office/drawing/2014/main" xmlns="" id="{56564307-CCFE-C2DA-C3FA-24841BC51525}"/>
               </a:ext>
             </a:extLst>
           </p:cNvPr>
@@ -3650,7 +3650,7 @@
           <p:cNvPr id="3" name="Subtitle 2">
             <a:extLst>
               <a:ext uri="{FF2B5EF4-FFF2-40B4-BE49-F238E27FC236}">
-                <a16:creationId xmlns:a16="http://schemas.microsoft.com/office/drawing/2014/main" id="{B6DC7054-4E10-828A-385E-C28E5C403031}"/>
+                <a16:creationId xmlns:a16="http://schemas.microsoft.com/office/drawing/2014/main" xmlns="" id="{B6DC7054-4E10-828A-385E-C28E5C403031}"/>
               </a:ext>
             </a:extLst>
           </p:cNvPr>
@@ -3722,7 +3722,7 @@
           <p:cNvPr id="2" name="Title 1">
             <a:extLst>
               <a:ext uri="{FF2B5EF4-FFF2-40B4-BE49-F238E27FC236}">
-                <a16:creationId xmlns:a16="http://schemas.microsoft.com/office/drawing/2014/main" id="{EE712710-7F7D-4BAF-01F3-379B624FF264}"/>
+                <a16:creationId xmlns:a16="http://schemas.microsoft.com/office/drawing/2014/main" xmlns="" id="{EE712710-7F7D-4BAF-01F3-379B624FF264}"/>
               </a:ext>
             </a:extLst>
           </p:cNvPr>
@@ -3752,7 +3752,7 @@
           <p:cNvPr id="3" name="Content Placeholder 2">
             <a:extLst>
               <a:ext uri="{FF2B5EF4-FFF2-40B4-BE49-F238E27FC236}">
-                <a16:creationId xmlns:a16="http://schemas.microsoft.com/office/drawing/2014/main" id="{8FBF0244-6E5E-24C8-846A-367F1883BBB4}"/>
+                <a16:creationId xmlns:a16="http://schemas.microsoft.com/office/drawing/2014/main" xmlns="" id="{8FBF0244-6E5E-24C8-846A-367F1883BBB4}"/>
               </a:ext>
             </a:extLst>
           </p:cNvPr>
@@ -3904,7 +3904,7 @@
           <p:cNvPr id="2" name="Title 1">
             <a:extLst>
               <a:ext uri="{FF2B5EF4-FFF2-40B4-BE49-F238E27FC236}">
-                <a16:creationId xmlns:a16="http://schemas.microsoft.com/office/drawing/2014/main" id="{1C025492-EB98-6E53-2E92-743238EACF4B}"/>
+                <a16:creationId xmlns:a16="http://schemas.microsoft.com/office/drawing/2014/main" xmlns="" id="{1C025492-EB98-6E53-2E92-743238EACF4B}"/>
               </a:ext>
             </a:extLst>
           </p:cNvPr>
@@ -3934,7 +3934,7 @@
           <p:cNvPr id="3" name="Content Placeholder 2">
             <a:extLst>
               <a:ext uri="{FF2B5EF4-FFF2-40B4-BE49-F238E27FC236}">
-                <a16:creationId xmlns:a16="http://schemas.microsoft.com/office/drawing/2014/main" id="{71A9DBAA-A09B-D7C1-2291-D70D22922E34}"/>
+                <a16:creationId xmlns:a16="http://schemas.microsoft.com/office/drawing/2014/main" xmlns="" id="{71A9DBAA-A09B-D7C1-2291-D70D22922E34}"/>
               </a:ext>
             </a:extLst>
           </p:cNvPr>
@@ -4053,7 +4053,7 @@
           <p:cNvPr id="2" name="Title 1">
             <a:extLst>
               <a:ext uri="{FF2B5EF4-FFF2-40B4-BE49-F238E27FC236}">
-                <a16:creationId xmlns:a16="http://schemas.microsoft.com/office/drawing/2014/main" id="{3206624A-BC53-9717-C487-EDCE136F0C1F}"/>
+                <a16:creationId xmlns:a16="http://schemas.microsoft.com/office/drawing/2014/main" xmlns="" id="{3206624A-BC53-9717-C487-EDCE136F0C1F}"/>
               </a:ext>
             </a:extLst>
           </p:cNvPr>
@@ -4083,7 +4083,7 @@
           <p:cNvPr id="3" name="Content Placeholder 2">
             <a:extLst>
               <a:ext uri="{FF2B5EF4-FFF2-40B4-BE49-F238E27FC236}">
-                <a16:creationId xmlns:a16="http://schemas.microsoft.com/office/drawing/2014/main" id="{0062A467-253C-982C-B642-60E93455862D}"/>
+                <a16:creationId xmlns:a16="http://schemas.microsoft.com/office/drawing/2014/main" xmlns="" id="{0062A467-253C-982C-B642-60E93455862D}"/>
               </a:ext>
             </a:extLst>
           </p:cNvPr>
@@ -4119,7 +4119,7 @@
           <p:cNvPr id="5" name="Picture 4" descr="A graph of a line&#10;&#10;Description automatically generated with medium confidence">
             <a:extLst>
               <a:ext uri="{FF2B5EF4-FFF2-40B4-BE49-F238E27FC236}">
-                <a16:creationId xmlns:a16="http://schemas.microsoft.com/office/drawing/2014/main" id="{03B01765-5074-24D0-8CD7-5393E7554BF5}"/>
+                <a16:creationId xmlns:a16="http://schemas.microsoft.com/office/drawing/2014/main" xmlns="" id="{03B01765-5074-24D0-8CD7-5393E7554BF5}"/>
               </a:ext>
             </a:extLst>
           </p:cNvPr>
@@ -4171,7 +4171,7 @@
         <p:cNvPr id="1" name="">
           <a:extLst>
             <a:ext uri="{FF2B5EF4-FFF2-40B4-BE49-F238E27FC236}">
-              <a16:creationId xmlns:a16="http://schemas.microsoft.com/office/drawing/2014/main" id="{17440ABB-E972-8E6F-3BED-FCCEBF204DDD}"/>
+              <a16:creationId xmlns:a16="http://schemas.microsoft.com/office/drawing/2014/main" xmlns="" id="{17440ABB-E972-8E6F-3BED-FCCEBF204DDD}"/>
             </a:ext>
           </a:extLst>
         </p:cNvPr>
@@ -4191,7 +4191,7 @@
           <p:cNvPr id="2" name="Title 1">
             <a:extLst>
               <a:ext uri="{FF2B5EF4-FFF2-40B4-BE49-F238E27FC236}">
-                <a16:creationId xmlns:a16="http://schemas.microsoft.com/office/drawing/2014/main" id="{06CC4BCB-47A6-5FD5-6F6D-6B280EAB576C}"/>
+                <a16:creationId xmlns:a16="http://schemas.microsoft.com/office/drawing/2014/main" xmlns="" id="{06CC4BCB-47A6-5FD5-6F6D-6B280EAB576C}"/>
               </a:ext>
             </a:extLst>
           </p:cNvPr>
@@ -4221,7 +4221,7 @@
           <p:cNvPr id="8" name="Picture 7" descr="A map with blue and red text&#10;&#10;Description automatically generated">
             <a:extLst>
               <a:ext uri="{FF2B5EF4-FFF2-40B4-BE49-F238E27FC236}">
-                <a16:creationId xmlns:a16="http://schemas.microsoft.com/office/drawing/2014/main" id="{D8F2C9C7-31F9-B7DF-C43D-24430955B8B0}"/>
+                <a16:creationId xmlns:a16="http://schemas.microsoft.com/office/drawing/2014/main" xmlns="" id="{D8F2C9C7-31F9-B7DF-C43D-24430955B8B0}"/>
               </a:ext>
             </a:extLst>
           </p:cNvPr>
@@ -4273,7 +4273,7 @@
         <p:cNvPr id="1" name="">
           <a:extLst>
             <a:ext uri="{FF2B5EF4-FFF2-40B4-BE49-F238E27FC236}">
-              <a16:creationId xmlns:a16="http://schemas.microsoft.com/office/drawing/2014/main" id="{84580102-2A80-2648-6EC5-D0FA4F0DB7F9}"/>
+              <a16:creationId xmlns:a16="http://schemas.microsoft.com/office/drawing/2014/main" xmlns="" id="{84580102-2A80-2648-6EC5-D0FA4F0DB7F9}"/>
             </a:ext>
           </a:extLst>
         </p:cNvPr>
@@ -4293,7 +4293,7 @@
           <p:cNvPr id="2" name="Title 1">
             <a:extLst>
               <a:ext uri="{FF2B5EF4-FFF2-40B4-BE49-F238E27FC236}">
-                <a16:creationId xmlns:a16="http://schemas.microsoft.com/office/drawing/2014/main" id="{FECFA7DC-78BD-A523-108F-71D3B18FA42B}"/>
+                <a16:creationId xmlns:a16="http://schemas.microsoft.com/office/drawing/2014/main" xmlns="" id="{FECFA7DC-78BD-A523-108F-71D3B18FA42B}"/>
               </a:ext>
             </a:extLst>
           </p:cNvPr>
@@ -4323,7 +4323,7 @@
           <p:cNvPr id="4" name="Picture 3" descr="A map with purple dots&#10;&#10;Description automatically generated">
             <a:extLst>
               <a:ext uri="{FF2B5EF4-FFF2-40B4-BE49-F238E27FC236}">
-                <a16:creationId xmlns:a16="http://schemas.microsoft.com/office/drawing/2014/main" id="{9B9AFD27-A392-FA29-E3CB-F99FBEEEBBE9}"/>
+                <a16:creationId xmlns:a16="http://schemas.microsoft.com/office/drawing/2014/main" xmlns="" id="{9B9AFD27-A392-FA29-E3CB-F99FBEEEBBE9}"/>
               </a:ext>
             </a:extLst>
           </p:cNvPr>
@@ -4389,7 +4389,7 @@
           <p:cNvPr id="2" name="Title 1">
             <a:extLst>
               <a:ext uri="{FF2B5EF4-FFF2-40B4-BE49-F238E27FC236}">
-                <a16:creationId xmlns:a16="http://schemas.microsoft.com/office/drawing/2014/main" id="{ED17D2CC-C2F3-5240-E2CC-E5B08A82F89E}"/>
+                <a16:creationId xmlns:a16="http://schemas.microsoft.com/office/drawing/2014/main" xmlns="" id="{ED17D2CC-C2F3-5240-E2CC-E5B08A82F89E}"/>
               </a:ext>
             </a:extLst>
           </p:cNvPr>
@@ -4419,7 +4419,7 @@
           <p:cNvPr id="3" name="Content Placeholder 2">
             <a:extLst>
               <a:ext uri="{FF2B5EF4-FFF2-40B4-BE49-F238E27FC236}">
-                <a16:creationId xmlns:a16="http://schemas.microsoft.com/office/drawing/2014/main" id="{FA2222B3-93A5-77BE-E4BE-1FE250A6B072}"/>
+                <a16:creationId xmlns:a16="http://schemas.microsoft.com/office/drawing/2014/main" xmlns="" id="{FA2222B3-93A5-77BE-E4BE-1FE250A6B072}"/>
               </a:ext>
             </a:extLst>
           </p:cNvPr>
@@ -4490,8 +4490,47 @@
               <a:rPr lang="en-US" dirty="0">
                 <a:latin typeface="Century Schoolbook" panose="02040604050505020304" pitchFamily="18" charset="0"/>
               </a:rPr>
-              <a:t>Price demand elasticity for electricity: −0.607 (for every 1 percent increase in electricity price, demand decreases by 0.607%)</a:t>
-            </a:r>
+              <a:t>Price demand elasticity for electricity: −0.607 (for every 1 percent increase in electricity price, demand decreases by 0.607</a:t>
+            </a:r>
+            <a:r>
+              <a:rPr lang="en-US" dirty="0" smtClean="0">
+                <a:latin typeface="Century Schoolbook" panose="02040604050505020304" pitchFamily="18" charset="0"/>
+              </a:rPr>
+              <a:t>%) </a:t>
+            </a:r>
+            <a:r>
+              <a:rPr lang="en-US" altLang="zh-CN" dirty="0" smtClean="0">
+                <a:latin typeface="Century Schoolbook" panose="02040604050505020304" pitchFamily="18" charset="0"/>
+              </a:rPr>
+              <a:t>according </a:t>
+            </a:r>
+            <a:r>
+              <a:rPr lang="en-US" altLang="zh-CN" dirty="0">
+                <a:latin typeface="Century Schoolbook" panose="02040604050505020304" pitchFamily="18" charset="0"/>
+              </a:rPr>
+              <a:t>to studies on </a:t>
+            </a:r>
+            <a:r>
+              <a:rPr lang="en-US" altLang="zh-CN" i="1" dirty="0">
+                <a:latin typeface="Century Schoolbook" panose="02040604050505020304" pitchFamily="18" charset="0"/>
+              </a:rPr>
+              <a:t>Energy and </a:t>
+            </a:r>
+            <a:r>
+              <a:rPr lang="en-US" altLang="zh-CN" i="1" dirty="0" smtClean="0">
+                <a:latin typeface="Century Schoolbook" panose="02040604050505020304" pitchFamily="18" charset="0"/>
+              </a:rPr>
+              <a:t>Buildings</a:t>
+            </a:r>
+            <a:r>
+              <a:rPr lang="en-US" altLang="zh-CN" dirty="0" smtClean="0">
+                <a:latin typeface="Century Schoolbook" panose="02040604050505020304" pitchFamily="18" charset="0"/>
+              </a:rPr>
+              <a:t>.</a:t>
+            </a:r>
+            <a:endParaRPr lang="en-US" dirty="0">
+              <a:latin typeface="Century Schoolbook" panose="02040604050505020304" pitchFamily="18" charset="0"/>
+            </a:endParaRPr>
           </a:p>
           <a:p>
             <a:pPr lvl="1"/>
@@ -4551,7 +4590,7 @@
           <p:cNvPr id="2" name="Title 1">
             <a:extLst>
               <a:ext uri="{FF2B5EF4-FFF2-40B4-BE49-F238E27FC236}">
-                <a16:creationId xmlns:a16="http://schemas.microsoft.com/office/drawing/2014/main" id="{CC12B01E-DA83-918F-9770-400EA1DB6321}"/>
+                <a16:creationId xmlns:a16="http://schemas.microsoft.com/office/drawing/2014/main" xmlns="" id="{CC12B01E-DA83-918F-9770-400EA1DB6321}"/>
               </a:ext>
             </a:extLst>
           </p:cNvPr>
@@ -4581,7 +4620,7 @@
           <p:cNvPr id="3" name="Content Placeholder 2">
             <a:extLst>
               <a:ext uri="{FF2B5EF4-FFF2-40B4-BE49-F238E27FC236}">
-                <a16:creationId xmlns:a16="http://schemas.microsoft.com/office/drawing/2014/main" id="{D4E77A62-7133-76B5-F536-C67A5AA8F2E0}"/>
+                <a16:creationId xmlns:a16="http://schemas.microsoft.com/office/drawing/2014/main" xmlns="" id="{D4E77A62-7133-76B5-F536-C67A5AA8F2E0}"/>
               </a:ext>
             </a:extLst>
           </p:cNvPr>

</xml_diff>